<commit_message>
nice formatting for time in popup
</commit_message>
<xml_diff>
--- a/JSCrosscourse.pptx
+++ b/JSCrosscourse.pptx
@@ -21262,11 +21262,7 @@
             <a:pPr lvl="1"/>
             <a:r>
               <a:rPr lang="de-DE" dirty="0" smtClean="0"/>
-              <a:t>Vererbung ist daher auch nur zwischen Objekten </a:t>
-            </a:r>
-            <a:r>
-              <a:rPr lang="de-DE" dirty="0" smtClean="0"/>
-              <a:t>möglich</a:t>
+              <a:t>Vererbung ist daher auch nur zwischen Objekten möglich</a:t>
             </a:r>
           </a:p>
           <a:p>
@@ -22221,12 +22217,6 @@
               </a:rPr>
               <a:t>c1.logData();</a:t>
             </a:r>
-            <a:endParaRPr lang="de-DE" sz="1400" dirty="0">
-              <a:solidFill>
-                <a:srgbClr val="000000"/>
-              </a:solidFill>
-              <a:latin typeface="Consolas"/>
-            </a:endParaRPr>
           </a:p>
         </p:txBody>
       </p:sp>
@@ -23151,10 +23141,6 @@
               </a:rPr>
               <a:t>Variablen</a:t>
             </a:r>
-            <a:endParaRPr lang="de-DE" sz="1800" kern="0" dirty="0" smtClean="0">
-              <a:ea typeface="Arial Unicode MS" pitchFamily="34" charset="-128"/>
-              <a:cs typeface="Arial Unicode MS" pitchFamily="34" charset="-128"/>
-            </a:endParaRPr>
           </a:p>
         </p:txBody>
       </p:sp>
@@ -23242,10 +23228,6 @@
               </a:rPr>
               <a:t>Methode</a:t>
             </a:r>
-            <a:endParaRPr lang="de-DE" sz="1800" kern="0" dirty="0" smtClean="0">
-              <a:ea typeface="Arial Unicode MS" pitchFamily="34" charset="-128"/>
-              <a:cs typeface="Arial Unicode MS" pitchFamily="34" charset="-128"/>
-            </a:endParaRPr>
           </a:p>
         </p:txBody>
       </p:sp>
@@ -24963,15 +24945,19 @@
             </a:r>
             <a:r>
               <a:rPr lang="de-DE" dirty="0" smtClean="0"/>
-              <a:t>, die die eingegebene Nachricht als Variable „</a:t>
-            </a:r>
-            <a:r>
-              <a:rPr lang="de-DE" dirty="0" err="1" smtClean="0"/>
-              <a:t>text</a:t>
+              <a:t>, die die eingegebene Nachricht als Variable </a:t>
             </a:r>
             <a:r>
               <a:rPr lang="de-DE" dirty="0" smtClean="0"/>
-              <a:t>“ über einen AJAX-Request </a:t>
+              <a:t>„</a:t>
+            </a:r>
+            <a:r>
+              <a:rPr lang="de-DE" smtClean="0"/>
+              <a:t>message“ </a:t>
+            </a:r>
+            <a:r>
+              <a:rPr lang="de-DE" dirty="0" smtClean="0"/>
+              <a:t>über einen AJAX-Request </a:t>
             </a:r>
             <a:r>
               <a:rPr lang="de-DE" dirty="0"/>

</xml_diff>